<commit_message>
update caste study in japan - eng proof
</commit_message>
<xml_diff>
--- a/ppt/chap1.pptx
+++ b/ppt/chap1.pptx
@@ -7,6 +7,7 @@
   <p:sldIdLst>
     <p:sldId id="256" r:id="rId2"/>
     <p:sldId id="257" r:id="rId3"/>
+    <p:sldId id="258" r:id="rId4"/>
   </p:sldIdLst>
   <p:sldSz cx="12192000" cy="6858000"/>
   <p:notesSz cx="6858000" cy="9144000"/>
@@ -262,7 +263,7 @@
           <a:p>
             <a:fld id="{31D64954-C4C3-40AE-9E05-E5A489E98ACE}" type="datetimeFigureOut">
               <a:rPr lang="en-GB" smtClean="0"/>
-              <a:t>29/11/2023</a:t>
+              <a:t>15/01/2024</a:t>
             </a:fld>
             <a:endParaRPr lang="en-GB"/>
           </a:p>
@@ -462,7 +463,7 @@
           <a:p>
             <a:fld id="{31D64954-C4C3-40AE-9E05-E5A489E98ACE}" type="datetimeFigureOut">
               <a:rPr lang="en-GB" smtClean="0"/>
-              <a:t>29/11/2023</a:t>
+              <a:t>15/01/2024</a:t>
             </a:fld>
             <a:endParaRPr lang="en-GB"/>
           </a:p>
@@ -672,7 +673,7 @@
           <a:p>
             <a:fld id="{31D64954-C4C3-40AE-9E05-E5A489E98ACE}" type="datetimeFigureOut">
               <a:rPr lang="en-GB" smtClean="0"/>
-              <a:t>29/11/2023</a:t>
+              <a:t>15/01/2024</a:t>
             </a:fld>
             <a:endParaRPr lang="en-GB"/>
           </a:p>
@@ -872,7 +873,7 @@
           <a:p>
             <a:fld id="{31D64954-C4C3-40AE-9E05-E5A489E98ACE}" type="datetimeFigureOut">
               <a:rPr lang="en-GB" smtClean="0"/>
-              <a:t>29/11/2023</a:t>
+              <a:t>15/01/2024</a:t>
             </a:fld>
             <a:endParaRPr lang="en-GB"/>
           </a:p>
@@ -1148,7 +1149,7 @@
           <a:p>
             <a:fld id="{31D64954-C4C3-40AE-9E05-E5A489E98ACE}" type="datetimeFigureOut">
               <a:rPr lang="en-GB" smtClean="0"/>
-              <a:t>29/11/2023</a:t>
+              <a:t>15/01/2024</a:t>
             </a:fld>
             <a:endParaRPr lang="en-GB"/>
           </a:p>
@@ -1416,7 +1417,7 @@
           <a:p>
             <a:fld id="{31D64954-C4C3-40AE-9E05-E5A489E98ACE}" type="datetimeFigureOut">
               <a:rPr lang="en-GB" smtClean="0"/>
-              <a:t>29/11/2023</a:t>
+              <a:t>15/01/2024</a:t>
             </a:fld>
             <a:endParaRPr lang="en-GB"/>
           </a:p>
@@ -1831,7 +1832,7 @@
           <a:p>
             <a:fld id="{31D64954-C4C3-40AE-9E05-E5A489E98ACE}" type="datetimeFigureOut">
               <a:rPr lang="en-GB" smtClean="0"/>
-              <a:t>29/11/2023</a:t>
+              <a:t>15/01/2024</a:t>
             </a:fld>
             <a:endParaRPr lang="en-GB"/>
           </a:p>
@@ -1973,7 +1974,7 @@
           <a:p>
             <a:fld id="{31D64954-C4C3-40AE-9E05-E5A489E98ACE}" type="datetimeFigureOut">
               <a:rPr lang="en-GB" smtClean="0"/>
-              <a:t>29/11/2023</a:t>
+              <a:t>15/01/2024</a:t>
             </a:fld>
             <a:endParaRPr lang="en-GB"/>
           </a:p>
@@ -2086,7 +2087,7 @@
           <a:p>
             <a:fld id="{31D64954-C4C3-40AE-9E05-E5A489E98ACE}" type="datetimeFigureOut">
               <a:rPr lang="en-GB" smtClean="0"/>
-              <a:t>29/11/2023</a:t>
+              <a:t>15/01/2024</a:t>
             </a:fld>
             <a:endParaRPr lang="en-GB"/>
           </a:p>
@@ -2399,7 +2400,7 @@
           <a:p>
             <a:fld id="{31D64954-C4C3-40AE-9E05-E5A489E98ACE}" type="datetimeFigureOut">
               <a:rPr lang="en-GB" smtClean="0"/>
-              <a:t>29/11/2023</a:t>
+              <a:t>15/01/2024</a:t>
             </a:fld>
             <a:endParaRPr lang="en-GB"/>
           </a:p>
@@ -2688,7 +2689,7 @@
           <a:p>
             <a:fld id="{31D64954-C4C3-40AE-9E05-E5A489E98ACE}" type="datetimeFigureOut">
               <a:rPr lang="en-GB" smtClean="0"/>
-              <a:t>29/11/2023</a:t>
+              <a:t>15/01/2024</a:t>
             </a:fld>
             <a:endParaRPr lang="en-GB"/>
           </a:p>
@@ -2931,7 +2932,7 @@
           <a:p>
             <a:fld id="{31D64954-C4C3-40AE-9E05-E5A489E98ACE}" type="datetimeFigureOut">
               <a:rPr lang="en-GB" smtClean="0"/>
-              <a:t>29/11/2023</a:t>
+              <a:t>15/01/2024</a:t>
             </a:fld>
             <a:endParaRPr lang="en-GB"/>
           </a:p>
@@ -5203,6 +5204,482 @@
 </p:sld>
 </file>
 
+<file path=ppt/slides/slide3.xml><?xml version="1.0" encoding="utf-8"?>
+<p:sld xmlns:a="http://schemas.openxmlformats.org/drawingml/2006/main" xmlns:r="http://schemas.openxmlformats.org/officeDocument/2006/relationships" xmlns:p="http://schemas.openxmlformats.org/presentationml/2006/main">
+  <p:cSld>
+    <p:spTree>
+      <p:nvGrpSpPr>
+        <p:cNvPr id="1" name=""/>
+        <p:cNvGrpSpPr/>
+        <p:nvPr/>
+      </p:nvGrpSpPr>
+      <p:grpSpPr>
+        <a:xfrm>
+          <a:off x="0" y="0"/>
+          <a:ext cx="0" cy="0"/>
+          <a:chOff x="0" y="0"/>
+          <a:chExt cx="0" cy="0"/>
+        </a:xfrm>
+      </p:grpSpPr>
+      <p:grpSp>
+        <p:nvGrpSpPr>
+          <p:cNvPr id="11" name="Group 10">
+            <a:extLst>
+              <a:ext uri="{FF2B5EF4-FFF2-40B4-BE49-F238E27FC236}">
+                <a16:creationId xmlns:a16="http://schemas.microsoft.com/office/drawing/2014/main" id="{6234EE25-8BFC-43C9-863A-125A54D47C04}"/>
+              </a:ext>
+            </a:extLst>
+          </p:cNvPr>
+          <p:cNvGrpSpPr/>
+          <p:nvPr/>
+        </p:nvGrpSpPr>
+        <p:grpSpPr>
+          <a:xfrm>
+            <a:off x="1139023" y="1988418"/>
+            <a:ext cx="10367177" cy="3921315"/>
+            <a:chOff x="1312847" y="2335551"/>
+            <a:chExt cx="9188810" cy="2307011"/>
+          </a:xfrm>
+        </p:grpSpPr>
+        <p:sp>
+          <p:nvSpPr>
+            <p:cNvPr id="4" name="TextBox 3">
+              <a:extLst>
+                <a:ext uri="{FF2B5EF4-FFF2-40B4-BE49-F238E27FC236}">
+                  <a16:creationId xmlns:a16="http://schemas.microsoft.com/office/drawing/2014/main" id="{82F2AA07-6493-4258-941E-B7845D3E8F66}"/>
+                </a:ext>
+              </a:extLst>
+            </p:cNvPr>
+            <p:cNvSpPr txBox="1"/>
+            <p:nvPr/>
+          </p:nvSpPr>
+          <p:spPr>
+            <a:xfrm>
+              <a:off x="1312847" y="2335551"/>
+              <a:ext cx="4143730" cy="369332"/>
+            </a:xfrm>
+            <a:prstGeom prst="rect">
+              <a:avLst/>
+            </a:prstGeom>
+            <a:noFill/>
+          </p:spPr>
+          <p:txBody>
+            <a:bodyPr wrap="square">
+              <a:spAutoFit/>
+            </a:bodyPr>
+            <a:lstStyle/>
+            <a:p>
+              <a:pPr algn="ctr"/>
+              <a:r>
+                <a:rPr lang="en-GB" b="1" dirty="0">
+                  <a:solidFill>
+                    <a:schemeClr val="tx1"/>
+                  </a:solidFill>
+                </a:rPr>
+                <a:t>PART 1: </a:t>
+              </a:r>
+              <a:r>
+                <a:rPr lang="en-GB" b="1" dirty="0"/>
+                <a:t>AIR POLLUTION</a:t>
+              </a:r>
+              <a:endParaRPr lang="en-GB" b="1" dirty="0">
+                <a:solidFill>
+                  <a:schemeClr val="tx1"/>
+                </a:solidFill>
+              </a:endParaRPr>
+            </a:p>
+          </p:txBody>
+        </p:sp>
+        <p:sp>
+          <p:nvSpPr>
+            <p:cNvPr id="5" name="Rectangle: Rounded Corners 4">
+              <a:extLst>
+                <a:ext uri="{FF2B5EF4-FFF2-40B4-BE49-F238E27FC236}">
+                  <a16:creationId xmlns:a16="http://schemas.microsoft.com/office/drawing/2014/main" id="{9ACD4DCD-7618-42B9-9CA5-E5E5191DF545}"/>
+                </a:ext>
+              </a:extLst>
+            </p:cNvPr>
+            <p:cNvSpPr/>
+            <p:nvPr/>
+          </p:nvSpPr>
+          <p:spPr>
+            <a:xfrm>
+              <a:off x="5613557" y="2687965"/>
+              <a:ext cx="4807416" cy="1225769"/>
+            </a:xfrm>
+            <a:prstGeom prst="roundRect">
+              <a:avLst/>
+            </a:prstGeom>
+            <a:noFill/>
+            <a:ln>
+              <a:solidFill>
+                <a:schemeClr val="tx1"/>
+              </a:solidFill>
+            </a:ln>
+          </p:spPr>
+          <p:style>
+            <a:lnRef idx="2">
+              <a:schemeClr val="accent1">
+                <a:shade val="50000"/>
+              </a:schemeClr>
+            </a:lnRef>
+            <a:fillRef idx="1">
+              <a:schemeClr val="accent1"/>
+            </a:fillRef>
+            <a:effectRef idx="0">
+              <a:schemeClr val="accent1"/>
+            </a:effectRef>
+            <a:fontRef idx="minor">
+              <a:schemeClr val="lt1"/>
+            </a:fontRef>
+          </p:style>
+          <p:txBody>
+            <a:bodyPr rtlCol="0" anchor="ctr"/>
+            <a:lstStyle/>
+            <a:p>
+              <a:pPr>
+                <a:lnSpc>
+                  <a:spcPct val="150000"/>
+                </a:lnSpc>
+              </a:pPr>
+              <a:r>
+                <a:rPr lang="en-GB" b="1" dirty="0">
+                  <a:solidFill>
+                    <a:schemeClr val="tx1"/>
+                  </a:solidFill>
+                </a:rPr>
+                <a:t>4. Terrestrial carbon fluxes estimation</a:t>
+              </a:r>
+            </a:p>
+            <a:p>
+              <a:pPr marL="285750" indent="-285750">
+                <a:lnSpc>
+                  <a:spcPct val="150000"/>
+                </a:lnSpc>
+                <a:buFont typeface="Arial" panose="020B0604020202020204" pitchFamily="34" charset="0"/>
+                <a:buChar char="•"/>
+              </a:pPr>
+              <a:r>
+                <a:rPr lang="en-GB" dirty="0">
+                  <a:solidFill>
+                    <a:schemeClr val="tx1"/>
+                  </a:solidFill>
+                </a:rPr>
+                <a:t>4.1. Local plant functional types mapping</a:t>
+              </a:r>
+            </a:p>
+            <a:p>
+              <a:pPr marL="285750" indent="-285750">
+                <a:lnSpc>
+                  <a:spcPct val="150000"/>
+                </a:lnSpc>
+                <a:buFont typeface="Arial" panose="020B0604020202020204" pitchFamily="34" charset="0"/>
+                <a:buChar char="•"/>
+              </a:pPr>
+              <a:r>
+                <a:rPr lang="en-GB" dirty="0">
+                  <a:solidFill>
+                    <a:schemeClr val="tx1"/>
+                  </a:solidFill>
+                </a:rPr>
+                <a:t>4.2. Global terrestrial carbon fluxes estimates</a:t>
+              </a:r>
+            </a:p>
+          </p:txBody>
+        </p:sp>
+        <p:sp>
+          <p:nvSpPr>
+            <p:cNvPr id="6" name="Rectangle: Rounded Corners 5">
+              <a:extLst>
+                <a:ext uri="{FF2B5EF4-FFF2-40B4-BE49-F238E27FC236}">
+                  <a16:creationId xmlns:a16="http://schemas.microsoft.com/office/drawing/2014/main" id="{C62DA534-686D-414A-BBF7-A1E7C6B7A0AA}"/>
+                </a:ext>
+              </a:extLst>
+            </p:cNvPr>
+            <p:cNvSpPr/>
+            <p:nvPr/>
+          </p:nvSpPr>
+          <p:spPr>
+            <a:xfrm>
+              <a:off x="5604732" y="4238146"/>
+              <a:ext cx="4896925" cy="404416"/>
+            </a:xfrm>
+            <a:prstGeom prst="roundRect">
+              <a:avLst/>
+            </a:prstGeom>
+            <a:noFill/>
+            <a:ln>
+              <a:solidFill>
+                <a:schemeClr val="tx1"/>
+              </a:solidFill>
+            </a:ln>
+          </p:spPr>
+          <p:style>
+            <a:lnRef idx="2">
+              <a:schemeClr val="accent1">
+                <a:shade val="50000"/>
+              </a:schemeClr>
+            </a:lnRef>
+            <a:fillRef idx="1">
+              <a:schemeClr val="accent1"/>
+            </a:fillRef>
+            <a:effectRef idx="0">
+              <a:schemeClr val="accent1"/>
+            </a:effectRef>
+            <a:fontRef idx="minor">
+              <a:schemeClr val="lt1"/>
+            </a:fontRef>
+          </p:style>
+          <p:txBody>
+            <a:bodyPr rtlCol="0" anchor="ctr"/>
+            <a:lstStyle/>
+            <a:p>
+              <a:r>
+                <a:rPr lang="en-GB" b="1" dirty="0">
+                  <a:solidFill>
+                    <a:schemeClr val="tx1"/>
+                  </a:solidFill>
+                </a:rPr>
+                <a:t>5. Carbon neutrality roadmaps platform</a:t>
+              </a:r>
+            </a:p>
+          </p:txBody>
+        </p:sp>
+        <p:sp>
+          <p:nvSpPr>
+            <p:cNvPr id="7" name="Rectangle: Rounded Corners 6">
+              <a:extLst>
+                <a:ext uri="{FF2B5EF4-FFF2-40B4-BE49-F238E27FC236}">
+                  <a16:creationId xmlns:a16="http://schemas.microsoft.com/office/drawing/2014/main" id="{2A812FCC-912D-4CFC-AB51-84E6EF147475}"/>
+                </a:ext>
+              </a:extLst>
+            </p:cNvPr>
+            <p:cNvSpPr/>
+            <p:nvPr/>
+          </p:nvSpPr>
+          <p:spPr>
+            <a:xfrm>
+              <a:off x="1321669" y="2692886"/>
+              <a:ext cx="4134907" cy="1946720"/>
+            </a:xfrm>
+            <a:prstGeom prst="roundRect">
+              <a:avLst/>
+            </a:prstGeom>
+            <a:noFill/>
+            <a:ln>
+              <a:solidFill>
+                <a:schemeClr val="tx1"/>
+              </a:solidFill>
+            </a:ln>
+          </p:spPr>
+          <p:style>
+            <a:lnRef idx="2">
+              <a:schemeClr val="accent1">
+                <a:shade val="50000"/>
+              </a:schemeClr>
+            </a:lnRef>
+            <a:fillRef idx="1">
+              <a:schemeClr val="accent1"/>
+            </a:fillRef>
+            <a:effectRef idx="0">
+              <a:schemeClr val="accent1"/>
+            </a:effectRef>
+            <a:fontRef idx="minor">
+              <a:schemeClr val="lt1"/>
+            </a:fontRef>
+          </p:style>
+          <p:txBody>
+            <a:bodyPr rtlCol="0" anchor="ctr"/>
+            <a:lstStyle/>
+            <a:p>
+              <a:endParaRPr lang="en-GB" dirty="0">
+                <a:solidFill>
+                  <a:schemeClr val="tx1"/>
+                </a:solidFill>
+              </a:endParaRPr>
+            </a:p>
+          </p:txBody>
+        </p:sp>
+        <p:sp>
+          <p:nvSpPr>
+            <p:cNvPr id="8" name="TextBox 7">
+              <a:extLst>
+                <a:ext uri="{FF2B5EF4-FFF2-40B4-BE49-F238E27FC236}">
+                  <a16:creationId xmlns:a16="http://schemas.microsoft.com/office/drawing/2014/main" id="{60D8CC26-BC13-4CA0-A852-C356A8192B74}"/>
+                </a:ext>
+              </a:extLst>
+            </p:cNvPr>
+            <p:cNvSpPr txBox="1"/>
+            <p:nvPr/>
+          </p:nvSpPr>
+          <p:spPr>
+            <a:xfrm>
+              <a:off x="5622378" y="2355560"/>
+              <a:ext cx="4798594" cy="369332"/>
+            </a:xfrm>
+            <a:prstGeom prst="rect">
+              <a:avLst/>
+            </a:prstGeom>
+            <a:noFill/>
+          </p:spPr>
+          <p:txBody>
+            <a:bodyPr wrap="square">
+              <a:spAutoFit/>
+            </a:bodyPr>
+            <a:lstStyle/>
+            <a:p>
+              <a:pPr algn="ctr"/>
+              <a:r>
+                <a:rPr lang="en-GB" b="1" dirty="0">
+                  <a:solidFill>
+                    <a:schemeClr val="tx1"/>
+                  </a:solidFill>
+                </a:rPr>
+                <a:t>PART 2: GREENHOUSE GAS</a:t>
+              </a:r>
+            </a:p>
+          </p:txBody>
+        </p:sp>
+        <p:sp>
+          <p:nvSpPr>
+            <p:cNvPr id="9" name="TextBox 8">
+              <a:extLst>
+                <a:ext uri="{FF2B5EF4-FFF2-40B4-BE49-F238E27FC236}">
+                  <a16:creationId xmlns:a16="http://schemas.microsoft.com/office/drawing/2014/main" id="{531330E7-D194-4DCC-A61D-DA02E2CB5C9B}"/>
+                </a:ext>
+              </a:extLst>
+            </p:cNvPr>
+            <p:cNvSpPr txBox="1"/>
+            <p:nvPr/>
+          </p:nvSpPr>
+          <p:spPr>
+            <a:xfrm>
+              <a:off x="1330489" y="3032426"/>
+              <a:ext cx="4570777" cy="1295868"/>
+            </a:xfrm>
+            <a:prstGeom prst="rect">
+              <a:avLst/>
+            </a:prstGeom>
+            <a:noFill/>
+          </p:spPr>
+          <p:txBody>
+            <a:bodyPr wrap="square">
+              <a:spAutoFit/>
+            </a:bodyPr>
+            <a:lstStyle/>
+            <a:p>
+              <a:pPr>
+                <a:lnSpc>
+                  <a:spcPct val="150000"/>
+                </a:lnSpc>
+              </a:pPr>
+              <a:r>
+                <a:rPr lang="en-GB" b="1" dirty="0"/>
+                <a:t>3. Impact of interventions on air quality</a:t>
+              </a:r>
+            </a:p>
+            <a:p>
+              <a:pPr marL="285750" indent="-285750">
+                <a:lnSpc>
+                  <a:spcPct val="150000"/>
+                </a:lnSpc>
+                <a:buFont typeface="Arial" panose="020B0604020202020204" pitchFamily="34" charset="0"/>
+                <a:buChar char="•"/>
+              </a:pPr>
+              <a:r>
+                <a:rPr lang="en-GB" dirty="0">
+                  <a:solidFill>
+                    <a:schemeClr val="tx1"/>
+                  </a:solidFill>
+                </a:rPr>
+                <a:t>3.1 Case study in Ukraine</a:t>
+              </a:r>
+            </a:p>
+            <a:p>
+              <a:pPr marL="285750" indent="-285750">
+                <a:lnSpc>
+                  <a:spcPct val="150000"/>
+                </a:lnSpc>
+                <a:buFont typeface="Arial" panose="020B0604020202020204" pitchFamily="34" charset="0"/>
+                <a:buChar char="•"/>
+              </a:pPr>
+              <a:r>
+                <a:rPr lang="en-GB" dirty="0">
+                  <a:solidFill>
+                    <a:schemeClr val="tx1"/>
+                  </a:solidFill>
+                </a:rPr>
+                <a:t>3.2 Case study in Japan</a:t>
+              </a:r>
+            </a:p>
+          </p:txBody>
+        </p:sp>
+        <p:sp>
+          <p:nvSpPr>
+            <p:cNvPr id="10" name="Arrow: Down 9">
+              <a:extLst>
+                <a:ext uri="{FF2B5EF4-FFF2-40B4-BE49-F238E27FC236}">
+                  <a16:creationId xmlns:a16="http://schemas.microsoft.com/office/drawing/2014/main" id="{BA7D78F6-788A-4C07-AA10-0D971C97D97B}"/>
+                </a:ext>
+              </a:extLst>
+            </p:cNvPr>
+            <p:cNvSpPr/>
+            <p:nvPr/>
+          </p:nvSpPr>
+          <p:spPr>
+            <a:xfrm>
+              <a:off x="7894497" y="3951123"/>
+              <a:ext cx="245535" cy="249633"/>
+            </a:xfrm>
+            <a:prstGeom prst="downArrow">
+              <a:avLst/>
+            </a:prstGeom>
+            <a:noFill/>
+            <a:ln>
+              <a:solidFill>
+                <a:schemeClr val="tx1"/>
+              </a:solidFill>
+            </a:ln>
+          </p:spPr>
+          <p:style>
+            <a:lnRef idx="2">
+              <a:schemeClr val="accent1">
+                <a:shade val="50000"/>
+              </a:schemeClr>
+            </a:lnRef>
+            <a:fillRef idx="1">
+              <a:schemeClr val="accent1"/>
+            </a:fillRef>
+            <a:effectRef idx="0">
+              <a:schemeClr val="accent1"/>
+            </a:effectRef>
+            <a:fontRef idx="minor">
+              <a:schemeClr val="lt1"/>
+            </a:fontRef>
+          </p:style>
+          <p:txBody>
+            <a:bodyPr rtlCol="0" anchor="ctr"/>
+            <a:lstStyle/>
+            <a:p>
+              <a:pPr algn="ctr"/>
+              <a:endParaRPr lang="en-GB"/>
+            </a:p>
+          </p:txBody>
+        </p:sp>
+      </p:grpSp>
+    </p:spTree>
+    <p:extLst>
+      <p:ext uri="{BB962C8B-B14F-4D97-AF65-F5344CB8AC3E}">
+        <p14:creationId xmlns:p14="http://schemas.microsoft.com/office/powerpoint/2010/main" val="406783013"/>
+      </p:ext>
+    </p:extLst>
+  </p:cSld>
+  <p:clrMapOvr>
+    <a:masterClrMapping/>
+  </p:clrMapOvr>
+</p:sld>
+</file>
+
 <file path=ppt/theme/theme1.xml><?xml version="1.0" encoding="utf-8"?>
 <a:theme xmlns:a="http://schemas.openxmlformats.org/drawingml/2006/main" name="Office Theme">
   <a:themeElements>

</xml_diff>

<commit_message>
update cover and form
</commit_message>
<xml_diff>
--- a/ppt/chap1.pptx
+++ b/ppt/chap1.pptx
@@ -263,7 +263,7 @@
           <a:p>
             <a:fld id="{31D64954-C4C3-40AE-9E05-E5A489E98ACE}" type="datetimeFigureOut">
               <a:rPr lang="en-GB" smtClean="0"/>
-              <a:t>15/01/2024</a:t>
+              <a:t>07/02/2024</a:t>
             </a:fld>
             <a:endParaRPr lang="en-GB"/>
           </a:p>
@@ -463,7 +463,7 @@
           <a:p>
             <a:fld id="{31D64954-C4C3-40AE-9E05-E5A489E98ACE}" type="datetimeFigureOut">
               <a:rPr lang="en-GB" smtClean="0"/>
-              <a:t>15/01/2024</a:t>
+              <a:t>07/02/2024</a:t>
             </a:fld>
             <a:endParaRPr lang="en-GB"/>
           </a:p>
@@ -673,7 +673,7 @@
           <a:p>
             <a:fld id="{31D64954-C4C3-40AE-9E05-E5A489E98ACE}" type="datetimeFigureOut">
               <a:rPr lang="en-GB" smtClean="0"/>
-              <a:t>15/01/2024</a:t>
+              <a:t>07/02/2024</a:t>
             </a:fld>
             <a:endParaRPr lang="en-GB"/>
           </a:p>
@@ -873,7 +873,7 @@
           <a:p>
             <a:fld id="{31D64954-C4C3-40AE-9E05-E5A489E98ACE}" type="datetimeFigureOut">
               <a:rPr lang="en-GB" smtClean="0"/>
-              <a:t>15/01/2024</a:t>
+              <a:t>07/02/2024</a:t>
             </a:fld>
             <a:endParaRPr lang="en-GB"/>
           </a:p>
@@ -1149,7 +1149,7 @@
           <a:p>
             <a:fld id="{31D64954-C4C3-40AE-9E05-E5A489E98ACE}" type="datetimeFigureOut">
               <a:rPr lang="en-GB" smtClean="0"/>
-              <a:t>15/01/2024</a:t>
+              <a:t>07/02/2024</a:t>
             </a:fld>
             <a:endParaRPr lang="en-GB"/>
           </a:p>
@@ -1417,7 +1417,7 @@
           <a:p>
             <a:fld id="{31D64954-C4C3-40AE-9E05-E5A489E98ACE}" type="datetimeFigureOut">
               <a:rPr lang="en-GB" smtClean="0"/>
-              <a:t>15/01/2024</a:t>
+              <a:t>07/02/2024</a:t>
             </a:fld>
             <a:endParaRPr lang="en-GB"/>
           </a:p>
@@ -1832,7 +1832,7 @@
           <a:p>
             <a:fld id="{31D64954-C4C3-40AE-9E05-E5A489E98ACE}" type="datetimeFigureOut">
               <a:rPr lang="en-GB" smtClean="0"/>
-              <a:t>15/01/2024</a:t>
+              <a:t>07/02/2024</a:t>
             </a:fld>
             <a:endParaRPr lang="en-GB"/>
           </a:p>
@@ -1974,7 +1974,7 @@
           <a:p>
             <a:fld id="{31D64954-C4C3-40AE-9E05-E5A489E98ACE}" type="datetimeFigureOut">
               <a:rPr lang="en-GB" smtClean="0"/>
-              <a:t>15/01/2024</a:t>
+              <a:t>07/02/2024</a:t>
             </a:fld>
             <a:endParaRPr lang="en-GB"/>
           </a:p>
@@ -2087,7 +2087,7 @@
           <a:p>
             <a:fld id="{31D64954-C4C3-40AE-9E05-E5A489E98ACE}" type="datetimeFigureOut">
               <a:rPr lang="en-GB" smtClean="0"/>
-              <a:t>15/01/2024</a:t>
+              <a:t>07/02/2024</a:t>
             </a:fld>
             <a:endParaRPr lang="en-GB"/>
           </a:p>
@@ -2400,7 +2400,7 @@
           <a:p>
             <a:fld id="{31D64954-C4C3-40AE-9E05-E5A489E98ACE}" type="datetimeFigureOut">
               <a:rPr lang="en-GB" smtClean="0"/>
-              <a:t>15/01/2024</a:t>
+              <a:t>07/02/2024</a:t>
             </a:fld>
             <a:endParaRPr lang="en-GB"/>
           </a:p>
@@ -2689,7 +2689,7 @@
           <a:p>
             <a:fld id="{31D64954-C4C3-40AE-9E05-E5A489E98ACE}" type="datetimeFigureOut">
               <a:rPr lang="en-GB" smtClean="0"/>
-              <a:t>15/01/2024</a:t>
+              <a:t>07/02/2024</a:t>
             </a:fld>
             <a:endParaRPr lang="en-GB"/>
           </a:p>
@@ -2932,7 +2932,7 @@
           <a:p>
             <a:fld id="{31D64954-C4C3-40AE-9E05-E5A489E98ACE}" type="datetimeFigureOut">
               <a:rPr lang="en-GB" smtClean="0"/>
-              <a:t>15/01/2024</a:t>
+              <a:t>07/02/2024</a:t>
             </a:fld>
             <a:endParaRPr lang="en-GB"/>
           </a:p>
@@ -4964,7 +4964,7 @@
                     <a:schemeClr val="tx1"/>
                   </a:solidFill>
                 </a:rPr>
-                <a:t>8. Conclusions and future prospects </a:t>
+                <a:t>6. Conclusions and future prospects </a:t>
               </a:r>
             </a:p>
           </p:txBody>

</xml_diff>